<commit_message>
update day 2 presentation
</commit_message>
<xml_diff>
--- a/Day2/Day2- AngularJS.pptx
+++ b/Day2/Day2- AngularJS.pptx
@@ -6459,16 +6459,11 @@
               <a:rPr lang="en-US" dirty="0" smtClean="0"/>
               <a:t> Example: </a:t>
             </a:r>
-            <a:endParaRPr lang="en-US" dirty="0" smtClean="0"/>
-          </a:p>
-          <a:p>
-            <a:r>
-              <a:rPr lang="en-US" dirty="0" smtClean="0"/>
-              <a:t>&lt;</a:t>
-            </a:r>
-            <a:r>
-              <a:rPr lang="en-US" dirty="0" smtClean="0"/>
-              <a:t>div ng-app=“</a:t>
+          </a:p>
+          <a:p>
+            <a:r>
+              <a:rPr lang="en-US" dirty="0" smtClean="0"/>
+              <a:t>&lt;div ng-app=“</a:t>
             </a:r>
             <a:r>
               <a:rPr lang="en-US" dirty="0" err="1" smtClean="0"/>
@@ -6476,11 +6471,7 @@
             </a:r>
             <a:r>
               <a:rPr lang="en-US" dirty="0" smtClean="0"/>
-              <a:t>”&gt;/*Here we have an angular compiled HTML*/&lt;/div</a:t>
-            </a:r>
-            <a:r>
-              <a:rPr lang="en-US" dirty="0" smtClean="0"/>
-              <a:t>&gt;</a:t>
+              <a:t>”&gt;/*Here we have an angular compiled HTML*/&lt;/div&gt;</a:t>
             </a:r>
           </a:p>
           <a:p>
@@ -7981,11 +7972,7 @@
             </a:pPr>
             <a:r>
               <a:rPr lang="en-US" dirty="0" smtClean="0"/>
-              <a:t>ng-show </a:t>
-            </a:r>
-            <a:r>
-              <a:rPr lang="en-US" dirty="0" smtClean="0"/>
-              <a:t>– the ng-show directive shows or hides the given HTML element based  on the expression provided to the ng-show attribute</a:t>
+              <a:t>ng-show – the ng-show directive shows or hides the given HTML element based  on the expression provided to the ng-show attribute</a:t>
             </a:r>
           </a:p>
           <a:p>
@@ -8039,11 +8026,7 @@
             </a:pPr>
             <a:r>
               <a:rPr lang="en-US" dirty="0" smtClean="0"/>
-              <a:t>ng-if – </a:t>
-            </a:r>
-            <a:r>
-              <a:rPr lang="en-US" dirty="0" smtClean="0"/>
-              <a:t>similar to ng-hide/ng-show. The difference between ng-if and ng-show is that ng-if actually removes the HTML portion, while ng-show shows/hides it with CSS.</a:t>
+              <a:t>ng-if – similar to ng-hide/ng-show. The difference between ng-if and ng-show is that ng-if actually removes the HTML portion, while ng-show shows/hides it with CSS.</a:t>
             </a:r>
             <a:endParaRPr lang="en-US" dirty="0"/>
           </a:p>
@@ -8252,15 +8235,7 @@
             </a:pPr>
             <a:r>
               <a:rPr lang="en-US" dirty="0" smtClean="0"/>
-              <a:t>Other scopes </a:t>
-            </a:r>
-            <a:r>
-              <a:rPr lang="en-US" dirty="0" smtClean="0"/>
-              <a:t>are children </a:t>
-            </a:r>
-            <a:r>
-              <a:rPr lang="en-US" dirty="0" smtClean="0"/>
-              <a:t>of $</a:t>
+              <a:t>Other scopes are children of $</a:t>
             </a:r>
             <a:r>
               <a:rPr lang="en-US" dirty="0" err="1" smtClean="0"/>
@@ -8497,15 +8472,7 @@
             </a:pPr>
             <a:r>
               <a:rPr lang="en-US" dirty="0" smtClean="0"/>
-              <a:t>ng-model: binds a model variable to an </a:t>
-            </a:r>
-            <a:r>
-              <a:rPr lang="en-US" dirty="0" smtClean="0"/>
-              <a:t>element ng-controller</a:t>
-            </a:r>
-            <a:r>
-              <a:rPr lang="en-US" dirty="0" smtClean="0"/>
-              <a:t>: binds a controller to the current element</a:t>
+              <a:t>ng-model: binds a model variable to an element ng-controller: binds a controller to the current element</a:t>
             </a:r>
           </a:p>
         </p:txBody>
@@ -9932,11 +9899,7 @@
           <a:p>
             <a:r>
               <a:rPr lang="en-US" dirty="0" smtClean="0"/>
-              <a:t>Two</a:t>
-            </a:r>
-            <a:r>
-              <a:rPr lang="en-US" dirty="0" smtClean="0"/>
-              <a:t> way data binding</a:t>
+              <a:t>Two way data binding</a:t>
             </a:r>
             <a:endParaRPr lang="en-US" dirty="0"/>
           </a:p>

</xml_diff>

<commit_message>
am reusit sa sincronizez
</commit_message>
<xml_diff>
--- a/Day2/Day2- AngularJS.pptx
+++ b/Day2/Day2- AngularJS.pptx
@@ -6459,11 +6459,16 @@
               <a:rPr lang="en-US" dirty="0" smtClean="0"/>
               <a:t> Example: </a:t>
             </a:r>
-          </a:p>
-          <a:p>
-            <a:r>
-              <a:rPr lang="en-US" dirty="0" smtClean="0"/>
-              <a:t>&lt;div ng-app=“</a:t>
+            <a:endParaRPr lang="en-US" dirty="0" smtClean="0"/>
+          </a:p>
+          <a:p>
+            <a:r>
+              <a:rPr lang="en-US" dirty="0" smtClean="0"/>
+              <a:t>&lt;</a:t>
+            </a:r>
+            <a:r>
+              <a:rPr lang="en-US" dirty="0" smtClean="0"/>
+              <a:t>div ng-app=“</a:t>
             </a:r>
             <a:r>
               <a:rPr lang="en-US" dirty="0" err="1" smtClean="0"/>
@@ -6471,7 +6476,11 @@
             </a:r>
             <a:r>
               <a:rPr lang="en-US" dirty="0" smtClean="0"/>
-              <a:t>”&gt;/*Here we have an angular compiled HTML*/&lt;/div&gt;</a:t>
+              <a:t>”&gt;/*Here we have an angular compiled HTML*/&lt;/div</a:t>
+            </a:r>
+            <a:r>
+              <a:rPr lang="en-US" dirty="0" smtClean="0"/>
+              <a:t>&gt;</a:t>
             </a:r>
           </a:p>
           <a:p>
@@ -7972,7 +7981,11 @@
             </a:pPr>
             <a:r>
               <a:rPr lang="en-US" dirty="0" smtClean="0"/>
-              <a:t>ng-show – the ng-show directive shows or hides the given HTML element based  on the expression provided to the ng-show attribute</a:t>
+              <a:t>ng-show </a:t>
+            </a:r>
+            <a:r>
+              <a:rPr lang="en-US" dirty="0" smtClean="0"/>
+              <a:t>– the ng-show directive shows or hides the given HTML element based  on the expression provided to the ng-show attribute</a:t>
             </a:r>
           </a:p>
           <a:p>
@@ -8026,7 +8039,11 @@
             </a:pPr>
             <a:r>
               <a:rPr lang="en-US" dirty="0" smtClean="0"/>
-              <a:t>ng-if – similar to ng-hide/ng-show. The difference between ng-if and ng-show is that ng-if actually removes the HTML portion, while ng-show shows/hides it with CSS.</a:t>
+              <a:t>ng-if – </a:t>
+            </a:r>
+            <a:r>
+              <a:rPr lang="en-US" dirty="0" smtClean="0"/>
+              <a:t>similar to ng-hide/ng-show. The difference between ng-if and ng-show is that ng-if actually removes the HTML portion, while ng-show shows/hides it with CSS.</a:t>
             </a:r>
             <a:endParaRPr lang="en-US" dirty="0"/>
           </a:p>
@@ -8235,7 +8252,15 @@
             </a:pPr>
             <a:r>
               <a:rPr lang="en-US" dirty="0" smtClean="0"/>
-              <a:t>Other scopes are children of $</a:t>
+              <a:t>Other scopes </a:t>
+            </a:r>
+            <a:r>
+              <a:rPr lang="en-US" dirty="0" smtClean="0"/>
+              <a:t>are children </a:t>
+            </a:r>
+            <a:r>
+              <a:rPr lang="en-US" dirty="0" smtClean="0"/>
+              <a:t>of $</a:t>
             </a:r>
             <a:r>
               <a:rPr lang="en-US" dirty="0" err="1" smtClean="0"/>
@@ -8472,7 +8497,15 @@
             </a:pPr>
             <a:r>
               <a:rPr lang="en-US" dirty="0" smtClean="0"/>
-              <a:t>ng-model: binds a model variable to an element ng-controller: binds a controller to the current element</a:t>
+              <a:t>ng-model: binds a model variable to an </a:t>
+            </a:r>
+            <a:r>
+              <a:rPr lang="en-US" dirty="0" smtClean="0"/>
+              <a:t>element ng-controller</a:t>
+            </a:r>
+            <a:r>
+              <a:rPr lang="en-US" dirty="0" smtClean="0"/>
+              <a:t>: binds a controller to the current element</a:t>
             </a:r>
           </a:p>
         </p:txBody>
@@ -9899,7 +9932,11 @@
           <a:p>
             <a:r>
               <a:rPr lang="en-US" dirty="0" smtClean="0"/>
-              <a:t>Two way data binding</a:t>
+              <a:t>Two</a:t>
+            </a:r>
+            <a:r>
+              <a:rPr lang="en-US" dirty="0" smtClean="0"/>
+              <a:t> way data binding</a:t>
             </a:r>
             <a:endParaRPr lang="en-US" dirty="0"/>
           </a:p>

</xml_diff>